<commit_message>
Added extra class for git and github module7 Extra
</commit_message>
<xml_diff>
--- a/docs/Module7_2_Core_concept_in_git.pptx
+++ b/docs/Module7_2_Core_concept_in_git.pptx
@@ -294,7 +294,7 @@
             <a:fld id="{F08477C5-E648-4CAA-AA53-CC2ADDA1DA88}" type="datetimeFigureOut">
               <a:rPr lang="en-US" smtClean="0"/>
               <a:pPr/>
-              <a:t>10/21/2021</a:t>
+              <a:t>11/4/2021</a:t>
             </a:fld>
             <a:endParaRPr lang="en-US"/>
           </a:p>
@@ -695,7 +695,7 @@
             <a:fld id="{C18DA36D-35D1-430E-895C-153B9F48ABDA}" type="datetimeFigureOut">
               <a:rPr lang="en-US" smtClean="0"/>
               <a:pPr/>
-              <a:t>10/21/2021</a:t>
+              <a:t>11/4/2021</a:t>
             </a:fld>
             <a:endParaRPr lang="en-US"/>
           </a:p>
@@ -867,7 +867,7 @@
             <a:fld id="{C18DA36D-35D1-430E-895C-153B9F48ABDA}" type="datetimeFigureOut">
               <a:rPr lang="en-US" smtClean="0"/>
               <a:pPr/>
-              <a:t>10/21/2021</a:t>
+              <a:t>11/4/2021</a:t>
             </a:fld>
             <a:endParaRPr lang="en-US"/>
           </a:p>
@@ -1049,7 +1049,7 @@
             <a:fld id="{C18DA36D-35D1-430E-895C-153B9F48ABDA}" type="datetimeFigureOut">
               <a:rPr lang="en-US" smtClean="0"/>
               <a:pPr/>
-              <a:t>10/21/2021</a:t>
+              <a:t>11/4/2021</a:t>
             </a:fld>
             <a:endParaRPr lang="en-US"/>
           </a:p>
@@ -1221,7 +1221,7 @@
             <a:fld id="{C18DA36D-35D1-430E-895C-153B9F48ABDA}" type="datetimeFigureOut">
               <a:rPr lang="en-US" smtClean="0"/>
               <a:pPr/>
-              <a:t>10/21/2021</a:t>
+              <a:t>11/4/2021</a:t>
             </a:fld>
             <a:endParaRPr lang="en-US"/>
           </a:p>
@@ -1469,7 +1469,7 @@
             <a:fld id="{C18DA36D-35D1-430E-895C-153B9F48ABDA}" type="datetimeFigureOut">
               <a:rPr lang="en-US" smtClean="0"/>
               <a:pPr/>
-              <a:t>10/21/2021</a:t>
+              <a:t>11/4/2021</a:t>
             </a:fld>
             <a:endParaRPr lang="en-US"/>
           </a:p>
@@ -1703,7 +1703,7 @@
             <a:fld id="{C18DA36D-35D1-430E-895C-153B9F48ABDA}" type="datetimeFigureOut">
               <a:rPr lang="en-US" smtClean="0"/>
               <a:pPr/>
-              <a:t>10/21/2021</a:t>
+              <a:t>11/4/2021</a:t>
             </a:fld>
             <a:endParaRPr lang="en-US"/>
           </a:p>
@@ -2072,7 +2072,7 @@
             <a:fld id="{C18DA36D-35D1-430E-895C-153B9F48ABDA}" type="datetimeFigureOut">
               <a:rPr lang="en-US" smtClean="0"/>
               <a:pPr/>
-              <a:t>10/21/2021</a:t>
+              <a:t>11/4/2021</a:t>
             </a:fld>
             <a:endParaRPr lang="en-US"/>
           </a:p>
@@ -2192,7 +2192,7 @@
             <a:fld id="{C18DA36D-35D1-430E-895C-153B9F48ABDA}" type="datetimeFigureOut">
               <a:rPr lang="en-US" smtClean="0"/>
               <a:pPr/>
-              <a:t>10/21/2021</a:t>
+              <a:t>11/4/2021</a:t>
             </a:fld>
             <a:endParaRPr lang="en-US"/>
           </a:p>
@@ -2289,7 +2289,7 @@
             <a:fld id="{C18DA36D-35D1-430E-895C-153B9F48ABDA}" type="datetimeFigureOut">
               <a:rPr lang="en-US" smtClean="0"/>
               <a:pPr/>
-              <a:t>10/21/2021</a:t>
+              <a:t>11/4/2021</a:t>
             </a:fld>
             <a:endParaRPr lang="en-US"/>
           </a:p>
@@ -2568,7 +2568,7 @@
             <a:fld id="{C18DA36D-35D1-430E-895C-153B9F48ABDA}" type="datetimeFigureOut">
               <a:rPr lang="en-US" smtClean="0"/>
               <a:pPr/>
-              <a:t>10/21/2021</a:t>
+              <a:t>11/4/2021</a:t>
             </a:fld>
             <a:endParaRPr lang="en-US"/>
           </a:p>
@@ -2823,7 +2823,7 @@
             <a:fld id="{C18DA36D-35D1-430E-895C-153B9F48ABDA}" type="datetimeFigureOut">
               <a:rPr lang="en-US" smtClean="0"/>
               <a:pPr/>
-              <a:t>10/21/2021</a:t>
+              <a:t>11/4/2021</a:t>
             </a:fld>
             <a:endParaRPr lang="en-US"/>
           </a:p>
@@ -3038,7 +3038,7 @@
             <a:fld id="{C18DA36D-35D1-430E-895C-153B9F48ABDA}" type="datetimeFigureOut">
               <a:rPr lang="en-US" smtClean="0"/>
               <a:pPr/>
-              <a:t>10/21/2021</a:t>
+              <a:t>11/4/2021</a:t>
             </a:fld>
             <a:endParaRPr lang="en-US"/>
           </a:p>
@@ -8742,11 +8742,7 @@
           <a:p>
             <a:r>
               <a:rPr lang="en-US" dirty="0" smtClean="0"/>
-              <a:t>Code Time </a:t>
-            </a:r>
-            <a:r>
-              <a:rPr lang="en-US" dirty="0" smtClean="0"/>
-              <a:t> </a:t>
+              <a:t>Code Time  </a:t>
             </a:r>
             <a:endParaRPr lang="en-US" dirty="0"/>
           </a:p>

</xml_diff>